<commit_message>
Add annotation on workflow diagram
Add text "Submit as GitHub issue accompagnied by GitHub pull request".
</commit_message>
<xml_diff>
--- a/governance-release-process/governance_process_workflow.pptx
+++ b/governance-release-process/governance_process_workflow.pptx
@@ -211,7 +211,7 @@
           <a:p>
             <a:fld id="{3A939EFE-0303-44F6-9A16-FD3B5E015DB1}" type="datetimeFigureOut">
               <a:rPr lang="en-GB" smtClean="0"/>
-              <a:t>15/06/2021</a:t>
+              <a:t>18/06/2021</a:t>
             </a:fld>
             <a:endParaRPr lang="en-GB"/>
           </a:p>
@@ -377,7 +377,7 @@
           <a:p>
             <a:fld id="{A3B926D1-0013-4A80-B64E-9D824EE65210}" type="datetimeFigureOut">
               <a:rPr lang="en-GB" smtClean="0"/>
-              <a:t>15/06/2021</a:t>
+              <a:t>18/06/2021</a:t>
             </a:fld>
             <a:endParaRPr lang="en-GB"/>
           </a:p>
@@ -10657,6 +10657,159 @@
           </a:p>
         </p:txBody>
       </p:sp>
+      <p:sp>
+        <p:nvSpPr>
+          <p:cNvPr id="133" name="Line Callout 1 (Accent Bar) 132"/>
+          <p:cNvSpPr/>
+          <p:nvPr/>
+        </p:nvSpPr>
+        <p:spPr>
+          <a:xfrm>
+            <a:off x="4699647" y="-3506765"/>
+            <a:ext cx="3067049" cy="682835"/>
+          </a:xfrm>
+          <a:prstGeom prst="accentCallout1">
+            <a:avLst>
+              <a:gd name="adj1" fmla="val 29549"/>
+              <a:gd name="adj2" fmla="val -1448"/>
+              <a:gd name="adj3" fmla="val -2042"/>
+              <a:gd name="adj4" fmla="val -16574"/>
+            </a:avLst>
+          </a:prstGeom>
+          <a:noFill/>
+          <a:ln>
+            <a:solidFill>
+              <a:schemeClr val="tx1"/>
+            </a:solidFill>
+          </a:ln>
+        </p:spPr>
+        <p:style>
+          <a:lnRef idx="2">
+            <a:schemeClr val="accent1">
+              <a:shade val="50000"/>
+            </a:schemeClr>
+          </a:lnRef>
+          <a:fillRef idx="1">
+            <a:schemeClr val="accent1"/>
+          </a:fillRef>
+          <a:effectRef idx="0">
+            <a:schemeClr val="accent1"/>
+          </a:effectRef>
+          <a:fontRef idx="minor">
+            <a:schemeClr val="lt1"/>
+          </a:fontRef>
+        </p:style>
+        <p:txBody>
+          <a:bodyPr rtlCol="0" anchor="ctr"/>
+          <a:lstStyle/>
+          <a:p>
+            <a:r>
+              <a:rPr lang="en-US" sz="1600" i="1" dirty="0" smtClean="0">
+                <a:solidFill>
+                  <a:schemeClr val="tx1"/>
+                </a:solidFill>
+                <a:latin typeface="EC Square Sans Cond Pro" panose="020B0506040000020004"/>
+              </a:rPr>
+              <a:t>Submit as GitHub issue</a:t>
+            </a:r>
+          </a:p>
+          <a:p>
+            <a:r>
+              <a:rPr lang="en-US" sz="1600" i="1" dirty="0" err="1" smtClean="0">
+                <a:solidFill>
+                  <a:schemeClr val="tx1"/>
+                </a:solidFill>
+                <a:latin typeface="EC Square Sans Cond Pro" panose="020B0506040000020004"/>
+              </a:rPr>
+              <a:t>accompagnied</a:t>
+            </a:r>
+            <a:r>
+              <a:rPr lang="en-US" sz="1600" i="1" dirty="0" smtClean="0">
+                <a:solidFill>
+                  <a:schemeClr val="tx1"/>
+                </a:solidFill>
+                <a:latin typeface="EC Square Sans Cond Pro" panose="020B0506040000020004"/>
+              </a:rPr>
+              <a:t> by GitHub pull request</a:t>
+            </a:r>
+            <a:endParaRPr lang="da-DK" sz="1600" i="1" dirty="0">
+              <a:solidFill>
+                <a:schemeClr val="tx1"/>
+              </a:solidFill>
+              <a:latin typeface="EC Square Sans Cond Pro" panose="020B0506040000020004"/>
+            </a:endParaRPr>
+          </a:p>
+        </p:txBody>
+      </p:sp>
+      <p:pic>
+        <p:nvPicPr>
+          <p:cNvPr id="134" name="Picture 133"/>
+          <p:cNvPicPr>
+            <a:picLocks noChangeAspect="1"/>
+          </p:cNvPicPr>
+          <p:nvPr/>
+        </p:nvPicPr>
+        <p:blipFill>
+          <a:blip r:embed="rId2" cstate="print">
+            <a:duotone>
+              <a:prstClr val="black"/>
+              <a:schemeClr val="tx1">
+                <a:lumMod val="60000"/>
+                <a:lumOff val="40000"/>
+                <a:tint val="45000"/>
+                <a:satMod val="400000"/>
+              </a:schemeClr>
+            </a:duotone>
+            <a:extLst>
+              <a:ext uri="{28A0092B-C50C-407E-A947-70E740481C1C}">
+                <a14:useLocalDpi xmlns:a14="http://schemas.microsoft.com/office/drawing/2010/main" val="0"/>
+              </a:ext>
+            </a:extLst>
+          </a:blip>
+          <a:stretch>
+            <a:fillRect/>
+          </a:stretch>
+        </p:blipFill>
+        <p:spPr>
+          <a:xfrm>
+            <a:off x="7625889" y="-3188562"/>
+            <a:ext cx="272728" cy="272728"/>
+          </a:xfrm>
+          <a:prstGeom prst="rect">
+            <a:avLst/>
+          </a:prstGeom>
+        </p:spPr>
+      </p:pic>
+      <p:pic>
+        <p:nvPicPr>
+          <p:cNvPr id="135" name="Picture 134"/>
+          <p:cNvPicPr>
+            <a:picLocks noChangeAspect="1"/>
+          </p:cNvPicPr>
+          <p:nvPr/>
+        </p:nvPicPr>
+        <p:blipFill>
+          <a:blip r:embed="rId3">
+            <a:extLst>
+              <a:ext uri="{28A0092B-C50C-407E-A947-70E740481C1C}">
+                <a14:useLocalDpi xmlns:a14="http://schemas.microsoft.com/office/drawing/2010/main" val="0"/>
+              </a:ext>
+            </a:extLst>
+          </a:blip>
+          <a:stretch>
+            <a:fillRect/>
+          </a:stretch>
+        </p:blipFill>
+        <p:spPr>
+          <a:xfrm>
+            <a:off x="6559386" y="-3410061"/>
+            <a:ext cx="238125" cy="238125"/>
+          </a:xfrm>
+          <a:prstGeom prst="rect">
+            <a:avLst/>
+          </a:prstGeom>
+        </p:spPr>
+      </p:pic>
     </p:spTree>
     <p:extLst>
       <p:ext uri="{BB962C8B-B14F-4D97-AF65-F5344CB8AC3E}">

</xml_diff>

<commit_message>
Add new action to the workflow
Add the possible action at the end of the Comitology procedure
</commit_message>
<xml_diff>
--- a/governance-release-process/governance_process_workflow.pptx
+++ b/governance-release-process/governance_process_workflow.pptx
@@ -129,6 +129,14 @@
 </p:presentation>
 </file>
 
+<file path=ppt/revisionInfo.xml><?xml version="1.0" encoding="utf-8"?>
+<p1510:revInfo xmlns:a="http://schemas.openxmlformats.org/drawingml/2006/main" xmlns:r="http://schemas.openxmlformats.org/officeDocument/2006/relationships" xmlns:p1510="http://schemas.microsoft.com/office/powerpoint/2015/10/main">
+  <p1510:revLst>
+    <p1510:client id="{76987970-616D-4983-BBB2-47948D23D6BB}" v="1" dt="2023-01-24T17:37:06.248"/>
+  </p1510:revLst>
+</p1510:revInfo>
+</file>
+
 <file path=ppt/changesInfos/changesInfo1.xml><?xml version="1.0" encoding="utf-8"?>
 <pc:chgInfo xmlns:a="http://schemas.openxmlformats.org/drawingml/2006/main" xmlns:r="http://schemas.openxmlformats.org/officeDocument/2006/relationships" xmlns:ac="http://schemas.microsoft.com/office/drawing/2013/main/command" xmlns:pc="http://schemas.microsoft.com/office/powerpoint/2013/main/command">
   <pc:docChgLst>
@@ -210,6 +218,158 @@
         </pc:cxnChg>
         <pc:cxnChg chg="mod">
           <ac:chgData name="Fabio Vinci" userId="2a8124e690d2756c" providerId="LiveId" clId="{DAA9D501-8D83-4BE7-892D-DB39550B6510}" dt="2022-12-20T09:19:58.234" v="24" actId="14100"/>
+          <ac:cxnSpMkLst>
+            <pc:docMk/>
+            <pc:sldMk cId="2567996149" sldId="267"/>
+            <ac:cxnSpMk id="144" creationId="{B1B789B7-758E-6953-4D76-497EE4EF8FFF}"/>
+          </ac:cxnSpMkLst>
+        </pc:cxnChg>
+      </pc:sldChg>
+    </pc:docChg>
+  </pc:docChgLst>
+  <pc:docChgLst>
+    <pc:chgData name="Fabio Vinci" userId="2a8124e690d2756c" providerId="LiveId" clId="{76987970-616D-4983-BBB2-47948D23D6BB}"/>
+    <pc:docChg chg="undo custSel modSld">
+      <pc:chgData name="Fabio Vinci" userId="2a8124e690d2756c" providerId="LiveId" clId="{76987970-616D-4983-BBB2-47948D23D6BB}" dt="2023-01-24T17:43:54.517" v="132" actId="14100"/>
+      <pc:docMkLst>
+        <pc:docMk/>
+      </pc:docMkLst>
+      <pc:sldChg chg="addSp modSp mod">
+        <pc:chgData name="Fabio Vinci" userId="2a8124e690d2756c" providerId="LiveId" clId="{76987970-616D-4983-BBB2-47948D23D6BB}" dt="2023-01-24T17:43:54.517" v="132" actId="14100"/>
+        <pc:sldMkLst>
+          <pc:docMk/>
+          <pc:sldMk cId="2567996149" sldId="267"/>
+        </pc:sldMkLst>
+        <pc:spChg chg="mod">
+          <ac:chgData name="Fabio Vinci" userId="2a8124e690d2756c" providerId="LiveId" clId="{76987970-616D-4983-BBB2-47948D23D6BB}" dt="2023-01-24T17:38:50.641" v="64" actId="1076"/>
+          <ac:spMkLst>
+            <pc:docMk/>
+            <pc:sldMk cId="2567996149" sldId="267"/>
+            <ac:spMk id="4" creationId="{00000000-0000-0000-0000-000000000000}"/>
+          </ac:spMkLst>
+        </pc:spChg>
+        <pc:spChg chg="add mod">
+          <ac:chgData name="Fabio Vinci" userId="2a8124e690d2756c" providerId="LiveId" clId="{76987970-616D-4983-BBB2-47948D23D6BB}" dt="2023-01-24T17:42:58.061" v="129" actId="1038"/>
+          <ac:spMkLst>
+            <pc:docMk/>
+            <pc:sldMk cId="2567996149" sldId="267"/>
+            <ac:spMk id="28" creationId="{81DD3ADE-2215-8DAD-74B0-CCDDE9A71D5D}"/>
+          </ac:spMkLst>
+        </pc:spChg>
+        <pc:spChg chg="mod">
+          <ac:chgData name="Fabio Vinci" userId="2a8124e690d2756c" providerId="LiveId" clId="{76987970-616D-4983-BBB2-47948D23D6BB}" dt="2023-01-24T17:42:00.733" v="102" actId="1076"/>
+          <ac:spMkLst>
+            <pc:docMk/>
+            <pc:sldMk cId="2567996149" sldId="267"/>
+            <ac:spMk id="29" creationId="{5A45CBD1-FE20-52C2-5FC1-A425CB7478C5}"/>
+          </ac:spMkLst>
+        </pc:spChg>
+        <pc:spChg chg="mod">
+          <ac:chgData name="Fabio Vinci" userId="2a8124e690d2756c" providerId="LiveId" clId="{76987970-616D-4983-BBB2-47948D23D6BB}" dt="2023-01-24T17:43:50.789" v="131" actId="1076"/>
+          <ac:spMkLst>
+            <pc:docMk/>
+            <pc:sldMk cId="2567996149" sldId="267"/>
+            <ac:spMk id="31" creationId="{00000000-0000-0000-0000-000000000000}"/>
+          </ac:spMkLst>
+        </pc:spChg>
+        <pc:spChg chg="add mod">
+          <ac:chgData name="Fabio Vinci" userId="2a8124e690d2756c" providerId="LiveId" clId="{76987970-616D-4983-BBB2-47948D23D6BB}" dt="2023-01-24T17:42:58.061" v="129" actId="1038"/>
+          <ac:spMkLst>
+            <pc:docMk/>
+            <pc:sldMk cId="2567996149" sldId="267"/>
+            <ac:spMk id="57" creationId="{15B1CFF9-220E-BA42-227F-DD6246538175}"/>
+          </ac:spMkLst>
+        </pc:spChg>
+        <pc:spChg chg="mod">
+          <ac:chgData name="Fabio Vinci" userId="2a8124e690d2756c" providerId="LiveId" clId="{76987970-616D-4983-BBB2-47948D23D6BB}" dt="2023-01-24T17:39:29.477" v="100" actId="14100"/>
+          <ac:spMkLst>
+            <pc:docMk/>
+            <pc:sldMk cId="2567996149" sldId="267"/>
+            <ac:spMk id="98" creationId="{00000000-0000-0000-0000-000000000000}"/>
+          </ac:spMkLst>
+        </pc:spChg>
+        <pc:spChg chg="mod">
+          <ac:chgData name="Fabio Vinci" userId="2a8124e690d2756c" providerId="LiveId" clId="{76987970-616D-4983-BBB2-47948D23D6BB}" dt="2023-01-24T17:43:16.059" v="130" actId="1076"/>
+          <ac:spMkLst>
+            <pc:docMk/>
+            <pc:sldMk cId="2567996149" sldId="267"/>
+            <ac:spMk id="99" creationId="{00000000-0000-0000-0000-000000000000}"/>
+          </ac:spMkLst>
+        </pc:spChg>
+        <pc:spChg chg="mod">
+          <ac:chgData name="Fabio Vinci" userId="2a8124e690d2756c" providerId="LiveId" clId="{76987970-616D-4983-BBB2-47948D23D6BB}" dt="2023-01-24T17:42:13.637" v="104" actId="1076"/>
+          <ac:spMkLst>
+            <pc:docMk/>
+            <pc:sldMk cId="2567996149" sldId="267"/>
+            <ac:spMk id="101" creationId="{00000000-0000-0000-0000-000000000000}"/>
+          </ac:spMkLst>
+        </pc:spChg>
+        <pc:spChg chg="mod">
+          <ac:chgData name="Fabio Vinci" userId="2a8124e690d2756c" providerId="LiveId" clId="{76987970-616D-4983-BBB2-47948D23D6BB}" dt="2023-01-24T17:39:04.860" v="97" actId="1037"/>
+          <ac:spMkLst>
+            <pc:docMk/>
+            <pc:sldMk cId="2567996149" sldId="267"/>
+            <ac:spMk id="140" creationId="{1DF73421-7163-823F-B4B4-80E3E1B88FD1}"/>
+          </ac:spMkLst>
+        </pc:spChg>
+        <pc:spChg chg="mod">
+          <ac:chgData name="Fabio Vinci" userId="2a8124e690d2756c" providerId="LiveId" clId="{76987970-616D-4983-BBB2-47948D23D6BB}" dt="2023-01-24T17:39:04.860" v="97" actId="1037"/>
+          <ac:spMkLst>
+            <pc:docMk/>
+            <pc:sldMk cId="2567996149" sldId="267"/>
+            <ac:spMk id="141" creationId="{656769F0-4C27-65EA-15A4-BE2BE40D3CDC}"/>
+          </ac:spMkLst>
+        </pc:spChg>
+        <pc:spChg chg="mod">
+          <ac:chgData name="Fabio Vinci" userId="2a8124e690d2756c" providerId="LiveId" clId="{76987970-616D-4983-BBB2-47948D23D6BB}" dt="2023-01-24T17:39:04.860" v="97" actId="1037"/>
+          <ac:spMkLst>
+            <pc:docMk/>
+            <pc:sldMk cId="2567996149" sldId="267"/>
+            <ac:spMk id="142" creationId="{06F1FF6B-0B75-7FA4-E6BD-1514E43B344C}"/>
+          </ac:spMkLst>
+        </pc:spChg>
+        <pc:cxnChg chg="add mod">
+          <ac:chgData name="Fabio Vinci" userId="2a8124e690d2756c" providerId="LiveId" clId="{76987970-616D-4983-BBB2-47948D23D6BB}" dt="2023-01-24T17:43:54.517" v="132" actId="14100"/>
+          <ac:cxnSpMkLst>
+            <pc:docMk/>
+            <pc:sldMk cId="2567996149" sldId="267"/>
+            <ac:cxnSpMk id="2" creationId="{781A127D-6AB4-07FD-AC6C-8ABFAE9B3144}"/>
+          </ac:cxnSpMkLst>
+        </pc:cxnChg>
+        <pc:cxnChg chg="mod">
+          <ac:chgData name="Fabio Vinci" userId="2a8124e690d2756c" providerId="LiveId" clId="{76987970-616D-4983-BBB2-47948D23D6BB}" dt="2023-01-24T17:43:50.789" v="131" actId="1076"/>
+          <ac:cxnSpMkLst>
+            <pc:docMk/>
+            <pc:sldMk cId="2567996149" sldId="267"/>
+            <ac:cxnSpMk id="22" creationId="{00000000-0000-0000-0000-000000000000}"/>
+          </ac:cxnSpMkLst>
+        </pc:cxnChg>
+        <pc:cxnChg chg="mod">
+          <ac:chgData name="Fabio Vinci" userId="2a8124e690d2756c" providerId="LiveId" clId="{76987970-616D-4983-BBB2-47948D23D6BB}" dt="2023-01-24T17:42:00.733" v="102" actId="1076"/>
+          <ac:cxnSpMkLst>
+            <pc:docMk/>
+            <pc:sldMk cId="2567996149" sldId="267"/>
+            <ac:cxnSpMk id="74" creationId="{00000000-0000-0000-0000-000000000000}"/>
+          </ac:cxnSpMkLst>
+        </pc:cxnChg>
+        <pc:cxnChg chg="mod">
+          <ac:chgData name="Fabio Vinci" userId="2a8124e690d2756c" providerId="LiveId" clId="{76987970-616D-4983-BBB2-47948D23D6BB}" dt="2023-01-24T17:43:50.789" v="131" actId="1076"/>
+          <ac:cxnSpMkLst>
+            <pc:docMk/>
+            <pc:sldMk cId="2567996149" sldId="267"/>
+            <ac:cxnSpMk id="104" creationId="{B488FFA1-A78F-FE56-6191-4B6B4E4C55BE}"/>
+          </ac:cxnSpMkLst>
+        </pc:cxnChg>
+        <pc:cxnChg chg="mod">
+          <ac:chgData name="Fabio Vinci" userId="2a8124e690d2756c" providerId="LiveId" clId="{76987970-616D-4983-BBB2-47948D23D6BB}" dt="2023-01-24T17:42:00.733" v="102" actId="1076"/>
+          <ac:cxnSpMkLst>
+            <pc:docMk/>
+            <pc:sldMk cId="2567996149" sldId="267"/>
+            <ac:cxnSpMk id="128" creationId="{012D35A5-7EC7-9931-C964-8D655E774740}"/>
+          </ac:cxnSpMkLst>
+        </pc:cxnChg>
+        <pc:cxnChg chg="mod">
+          <ac:chgData name="Fabio Vinci" userId="2a8124e690d2756c" providerId="LiveId" clId="{76987970-616D-4983-BBB2-47948D23D6BB}" dt="2023-01-24T17:42:00.733" v="102" actId="1076"/>
           <ac:cxnSpMkLst>
             <pc:docMk/>
             <pc:sldMk cId="2567996149" sldId="267"/>
@@ -615,7 +775,7 @@
           <a:p>
             <a:fld id="{3A939EFE-0303-44F6-9A16-FD3B5E015DB1}" type="datetimeFigureOut">
               <a:rPr lang="en-GB" smtClean="0"/>
-              <a:t>20/12/2022</a:t>
+              <a:t>24/01/2023</a:t>
             </a:fld>
             <a:endParaRPr lang="en-GB"/>
           </a:p>
@@ -781,7 +941,7 @@
           <a:p>
             <a:fld id="{A3B926D1-0013-4A80-B64E-9D824EE65210}" type="datetimeFigureOut">
               <a:rPr lang="en-GB" smtClean="0"/>
-              <a:t>20/12/2022</a:t>
+              <a:t>24/01/2023</a:t>
             </a:fld>
             <a:endParaRPr lang="en-GB"/>
           </a:p>
@@ -8809,9 +8969,9 @@
           <p:nvPr/>
         </p:nvCxnSpPr>
         <p:spPr>
-          <a:xfrm flipH="1">
-            <a:off x="41957" y="12085493"/>
-            <a:ext cx="1" cy="858488"/>
+          <a:xfrm>
+            <a:off x="41956" y="12317666"/>
+            <a:ext cx="1" cy="1412867"/>
           </a:xfrm>
           <a:prstGeom prst="straightConnector1">
             <a:avLst/>
@@ -9477,7 +9637,7 @@
         </p:nvSpPr>
         <p:spPr>
           <a:xfrm>
-            <a:off x="-1393142" y="11336698"/>
+            <a:off x="-1393144" y="11568871"/>
             <a:ext cx="2870199" cy="748795"/>
           </a:xfrm>
           <a:prstGeom prst="rect">
@@ -13861,19 +14021,17 @@
           <p:cNvCxnSpPr>
             <a:cxnSpLocks/>
             <a:stCxn id="29" idx="3"/>
-            <a:endCxn id="98" idx="1"/>
+            <a:endCxn id="98" idx="0"/>
           </p:cNvCxnSpPr>
           <p:nvPr/>
         </p:nvCxnSpPr>
         <p:spPr>
           <a:xfrm>
-            <a:off x="437957" y="13339981"/>
-            <a:ext cx="1659237" cy="1287451"/>
-          </a:xfrm>
-          <a:prstGeom prst="bentConnector3">
-            <a:avLst>
-              <a:gd name="adj1" fmla="val 50000"/>
-            </a:avLst>
+            <a:off x="437957" y="14126533"/>
+            <a:ext cx="4209186" cy="946657"/>
+          </a:xfrm>
+          <a:prstGeom prst="bentConnector2">
+            <a:avLst/>
           </a:prstGeom>
           <a:ln w="15875">
             <a:solidFill>
@@ -15884,7 +16042,7 @@
         </p:nvSpPr>
         <p:spPr>
           <a:xfrm>
-            <a:off x="2097194" y="14088919"/>
+            <a:off x="3214907" y="15073190"/>
             <a:ext cx="2864471" cy="1077026"/>
           </a:xfrm>
           <a:prstGeom prst="rect">
@@ -15930,7 +16088,7 @@
         </p:nvSpPr>
         <p:spPr>
           <a:xfrm>
-            <a:off x="3038850" y="13586886"/>
+            <a:off x="4872210" y="14564375"/>
             <a:ext cx="1232715" cy="298186"/>
           </a:xfrm>
           <a:prstGeom prst="roundRect">
@@ -15999,8 +16157,8 @@
         </p:nvSpPr>
         <p:spPr>
           <a:xfrm>
-            <a:off x="1249281" y="13371945"/>
-            <a:ext cx="1652746" cy="616644"/>
+            <a:off x="2797313" y="14406782"/>
+            <a:ext cx="1652746" cy="613373"/>
           </a:xfrm>
           <a:prstGeom prst="rect">
             <a:avLst/>
@@ -16095,7 +16253,7 @@
         </p:nvSpPr>
         <p:spPr>
           <a:xfrm>
-            <a:off x="-354043" y="12943981"/>
+            <a:off x="-354043" y="13730533"/>
             <a:ext cx="792000" cy="792000"/>
           </a:xfrm>
           <a:prstGeom prst="diamond">
@@ -16250,8 +16408,8 @@
         </p:nvCxnSpPr>
         <p:spPr>
           <a:xfrm rot="10800000" flipV="1">
-            <a:off x="41958" y="10330018"/>
-            <a:ext cx="2934112" cy="1006679"/>
+            <a:off x="41956" y="10330019"/>
+            <a:ext cx="2934114" cy="1238852"/>
           </a:xfrm>
           <a:prstGeom prst="bentConnector2">
             <a:avLst/>
@@ -16296,8 +16454,8 @@
         </p:nvCxnSpPr>
         <p:spPr>
           <a:xfrm rot="10800000" flipV="1">
-            <a:off x="-951249" y="13339980"/>
-            <a:ext cx="597207" cy="2712173"/>
+            <a:off x="-951249" y="14126532"/>
+            <a:ext cx="597207" cy="1925621"/>
           </a:xfrm>
           <a:prstGeom prst="bentConnector2">
             <a:avLst/>
@@ -16502,7 +16660,7 @@
         </p:nvSpPr>
         <p:spPr>
           <a:xfrm>
-            <a:off x="1687904" y="16773771"/>
+            <a:off x="1040204" y="16773771"/>
             <a:ext cx="2870199" cy="1077026"/>
           </a:xfrm>
           <a:prstGeom prst="rect">
@@ -16554,7 +16712,7 @@
         </p:nvSpPr>
         <p:spPr>
           <a:xfrm>
-            <a:off x="1199922" y="15723035"/>
+            <a:off x="552222" y="15723035"/>
             <a:ext cx="1944000" cy="611771"/>
           </a:xfrm>
           <a:prstGeom prst="rect">
@@ -16599,7 +16757,7 @@
         </p:nvSpPr>
         <p:spPr>
           <a:xfrm>
-            <a:off x="1325922" y="16334806"/>
+            <a:off x="678222" y="16334806"/>
             <a:ext cx="1692000" cy="298186"/>
           </a:xfrm>
           <a:prstGeom prst="roundRect">
@@ -16689,12 +16847,12 @@
         </p:nvCxnSpPr>
         <p:spPr>
           <a:xfrm rot="16200000" flipH="1">
-            <a:off x="63585" y="13714352"/>
-            <a:ext cx="3037790" cy="3081047"/>
+            <a:off x="133011" y="14431478"/>
+            <a:ext cx="2251238" cy="2433347"/>
           </a:xfrm>
           <a:prstGeom prst="bentConnector3">
             <a:avLst>
-              <a:gd name="adj1" fmla="val 55045"/>
+              <a:gd name="adj1" fmla="val 50000"/>
             </a:avLst>
           </a:prstGeom>
           <a:ln w="15875">
@@ -16719,6 +16877,165 @@
           </a:fontRef>
         </p:style>
       </p:cxnSp>
+      <p:cxnSp>
+        <p:nvCxnSpPr>
+          <p:cNvPr id="2" name="Straight Arrow Connector 78">
+            <a:extLst>
+              <a:ext uri="{FF2B5EF4-FFF2-40B4-BE49-F238E27FC236}">
+                <a16:creationId xmlns:a16="http://schemas.microsoft.com/office/drawing/2014/main" id="{781A127D-6AB4-07FD-AC6C-8ABFAE9B3144}"/>
+              </a:ext>
+            </a:extLst>
+          </p:cNvPr>
+          <p:cNvCxnSpPr>
+            <a:cxnSpLocks/>
+            <a:stCxn id="27" idx="1"/>
+            <a:endCxn id="31" idx="3"/>
+          </p:cNvCxnSpPr>
+          <p:nvPr/>
+        </p:nvCxnSpPr>
+        <p:spPr>
+          <a:xfrm rot="10800000">
+            <a:off x="1477056" y="11943270"/>
+            <a:ext cx="4050993" cy="1409707"/>
+          </a:xfrm>
+          <a:prstGeom prst="bentConnector3">
+            <a:avLst>
+              <a:gd name="adj1" fmla="val 77902"/>
+            </a:avLst>
+          </a:prstGeom>
+          <a:ln w="15875">
+            <a:solidFill>
+              <a:schemeClr val="tx1"/>
+            </a:solidFill>
+            <a:prstDash val="dash"/>
+            <a:tailEnd type="triangle" w="lg" len="lg"/>
+          </a:ln>
+        </p:spPr>
+        <p:style>
+          <a:lnRef idx="1">
+            <a:schemeClr val="accent1"/>
+          </a:lnRef>
+          <a:fillRef idx="0">
+            <a:schemeClr val="accent1"/>
+          </a:fillRef>
+          <a:effectRef idx="0">
+            <a:schemeClr val="accent1"/>
+          </a:effectRef>
+          <a:fontRef idx="minor">
+            <a:schemeClr val="tx1"/>
+          </a:fontRef>
+        </p:style>
+      </p:cxnSp>
+      <p:sp>
+        <p:nvSpPr>
+          <p:cNvPr id="28" name="Rounded Rectangle 127">
+            <a:extLst>
+              <a:ext uri="{FF2B5EF4-FFF2-40B4-BE49-F238E27FC236}">
+                <a16:creationId xmlns:a16="http://schemas.microsoft.com/office/drawing/2014/main" id="{81DD3ADE-2215-8DAD-74B0-CCDDE9A71D5D}"/>
+              </a:ext>
+            </a:extLst>
+          </p:cNvPr>
+          <p:cNvSpPr/>
+          <p:nvPr/>
+        </p:nvSpPr>
+        <p:spPr>
+          <a:xfrm>
+            <a:off x="3243594" y="12392546"/>
+            <a:ext cx="1355987" cy="298186"/>
+          </a:xfrm>
+          <a:prstGeom prst="roundRect">
+            <a:avLst>
+              <a:gd name="adj" fmla="val 50000"/>
+            </a:avLst>
+          </a:prstGeom>
+          <a:solidFill>
+            <a:srgbClr val="CF8D23"/>
+          </a:solidFill>
+          <a:ln>
+            <a:noFill/>
+          </a:ln>
+        </p:spPr>
+        <p:style>
+          <a:lnRef idx="2">
+            <a:schemeClr val="accent1">
+              <a:shade val="50000"/>
+            </a:schemeClr>
+          </a:lnRef>
+          <a:fillRef idx="1">
+            <a:schemeClr val="accent1"/>
+          </a:fillRef>
+          <a:effectRef idx="0">
+            <a:schemeClr val="accent1"/>
+          </a:effectRef>
+          <a:fontRef idx="minor">
+            <a:schemeClr val="lt1"/>
+          </a:fontRef>
+        </p:style>
+        <p:txBody>
+          <a:bodyPr rtlCol="0" anchor="ctr"/>
+          <a:lstStyle/>
+          <a:p>
+            <a:pPr algn="ctr"/>
+            <a:r>
+              <a:rPr lang="da-DK" sz="1400" dirty="0">
+                <a:solidFill>
+                  <a:schemeClr val="bg1"/>
+                </a:solidFill>
+                <a:latin typeface="EC Square Sans Cond Pro" panose="020B0506040000020004"/>
+              </a:rPr>
+              <a:t>IR revised</a:t>
+            </a:r>
+          </a:p>
+        </p:txBody>
+      </p:sp>
+      <p:sp>
+        <p:nvSpPr>
+          <p:cNvPr id="57" name="TextBox 86">
+            <a:extLst>
+              <a:ext uri="{FF2B5EF4-FFF2-40B4-BE49-F238E27FC236}">
+                <a16:creationId xmlns:a16="http://schemas.microsoft.com/office/drawing/2014/main" id="{15B1CFF9-220E-BA42-227F-DD6246538175}"/>
+              </a:ext>
+            </a:extLst>
+          </p:cNvPr>
+          <p:cNvSpPr txBox="1"/>
+          <p:nvPr/>
+        </p:nvSpPr>
+        <p:spPr>
+          <a:xfrm>
+            <a:off x="2457963" y="12681654"/>
+            <a:ext cx="2870198" cy="613373"/>
+          </a:xfrm>
+          <a:prstGeom prst="rect">
+            <a:avLst/>
+          </a:prstGeom>
+          <a:noFill/>
+          <a:ln w="19050">
+            <a:noFill/>
+          </a:ln>
+        </p:spPr>
+        <p:txBody>
+          <a:bodyPr wrap="square" rtlCol="0" anchor="ctr" anchorCtr="0">
+            <a:spAutoFit/>
+          </a:bodyPr>
+          <a:lstStyle/>
+          <a:p>
+            <a:pPr algn="ctr">
+              <a:lnSpc>
+                <a:spcPts val="2000"/>
+              </a:lnSpc>
+            </a:pPr>
+            <a:r>
+              <a:rPr lang="en-GB" sz="2133" dirty="0">
+                <a:latin typeface="EC Square Sans Cond Pro" panose="020B0506040000020004" pitchFamily="34" charset="0"/>
+              </a:rPr>
+              <a:t>if endorsed and after publication of revised IR</a:t>
+            </a:r>
+            <a:endParaRPr lang="en-GB" sz="2133" i="1" dirty="0">
+              <a:latin typeface="EC Square Sans Cond Pro" panose="020B0506040000020004" pitchFamily="34" charset="0"/>
+            </a:endParaRPr>
+          </a:p>
+        </p:txBody>
+      </p:sp>
     </p:spTree>
     <p:extLst>
       <p:ext uri="{BB962C8B-B14F-4D97-AF65-F5344CB8AC3E}">

</xml_diff>